<commit_message>
Iterators and Comparators - Exercise
</commit_message>
<xml_diff>
--- a/CSharp_OOP_Advanced/03_IteratorsAndComparators/03. CSharp-OOP-Advanced-Iterators-and-Comparators.pptx
+++ b/CSharp_OOP_Advanced/03_IteratorsAndComparators/03. CSharp-OOP-Advanced-Iterators-and-Comparators.pptx
@@ -361,7 +361,7 @@
             <a:fld id="{FE5B4EDC-59C0-49C7-8ADA-5A781B329E02}" type="datetimeFigureOut">
               <a:rPr lang="en-US"/>
               <a:pPr/>
-              <a:t>26-Mar-18</a:t>
+              <a:t>4/11/2018</a:t>
             </a:fld>
             <a:endParaRPr dirty="0"/>
           </a:p>
@@ -560,7 +560,7 @@
             <a:fld id="{F2D8D46A-B586-417D-BFBD-8C8FE0AAF762}" type="datetimeFigureOut">
               <a:rPr lang="en-US" smtClean="0"/>
               <a:pPr/>
-              <a:t>26-Mar-18</a:t>
+              <a:t>4/11/2018</a:t>
             </a:fld>
             <a:endParaRPr lang="en-US"/>
           </a:p>
@@ -3172,7 +3172,7 @@
             <a:fld id="{055373AC-9AA7-423B-BA00-BA1C74164DBD}" type="datetime1">
               <a:rPr lang="en-US" smtClean="0"/>
               <a:pPr/>
-              <a:t>26-Mar-18</a:t>
+              <a:t>4/11/2018</a:t>
             </a:fld>
             <a:endParaRPr lang="en-US" dirty="0"/>
           </a:p>
@@ -4403,7 +4403,7 @@
             <a:fld id="{055373AC-9AA7-423B-BA00-BA1C74164DBD}" type="datetime1">
               <a:rPr lang="en-US" smtClean="0"/>
               <a:pPr/>
-              <a:t>26-Mar-18</a:t>
+              <a:t>4/11/2018</a:t>
             </a:fld>
             <a:endParaRPr lang="en-US" dirty="0"/>
           </a:p>
@@ -13944,32 +13944,6 @@
           </a:p>
         </p:txBody>
       </p:sp>
-      <p:pic>
-        <p:nvPicPr>
-          <p:cNvPr id="11" name="Picture 2" descr="D:\_WORK PROJECTS\Nakov\Presentation Slides Design\STORE\Software University Foundation Logo BG and ENG black WHITOUT background CMYK.png"/>
-          <p:cNvPicPr>
-            <a:picLocks noChangeAspect="1" noChangeArrowheads="1"/>
-          </p:cNvPicPr>
-          <p:nvPr/>
-        </p:nvPicPr>
-        <p:blipFill>
-          <a:blip r:embed="rId3" cstate="print"/>
-          <a:srcRect/>
-          <a:stretch>
-            <a:fillRect/>
-          </a:stretch>
-        </p:blipFill>
-        <p:spPr bwMode="auto">
-          <a:xfrm>
-            <a:off x="9828212" y="228600"/>
-            <a:ext cx="2175525" cy="762000"/>
-          </a:xfrm>
-          <a:prstGeom prst="rect">
-            <a:avLst/>
-          </a:prstGeom>
-          <a:noFill/>
-        </p:spPr>
-      </p:pic>
       <p:sp>
         <p:nvSpPr>
           <p:cNvPr id="12" name="Rectangle 2"/>
@@ -15259,32 +15233,6 @@
           </a:p>
         </p:txBody>
       </p:sp>
-      <p:pic>
-        <p:nvPicPr>
-          <p:cNvPr id="11" name="Picture 2" descr="D:\_WORK PROJECTS\Nakov\Presentation Slides Design\STORE\Software University Foundation Logo BG and ENG black WHITOUT background CMYK.png"/>
-          <p:cNvPicPr>
-            <a:picLocks noChangeAspect="1" noChangeArrowheads="1"/>
-          </p:cNvPicPr>
-          <p:nvPr/>
-        </p:nvPicPr>
-        <p:blipFill>
-          <a:blip r:embed="rId3" cstate="print"/>
-          <a:srcRect/>
-          <a:stretch>
-            <a:fillRect/>
-          </a:stretch>
-        </p:blipFill>
-        <p:spPr bwMode="auto">
-          <a:xfrm>
-            <a:off x="9828212" y="228600"/>
-            <a:ext cx="2175525" cy="762000"/>
-          </a:xfrm>
-          <a:prstGeom prst="rect">
-            <a:avLst/>
-          </a:prstGeom>
-          <a:noFill/>
-        </p:spPr>
-      </p:pic>
       <p:sp>
         <p:nvSpPr>
           <p:cNvPr id="12" name="Rectangle 2"/>
@@ -19908,6 +19856,10 @@
                 </a:solidFill>
               </a:rPr>
               <a:t>sli.do</a:t>
+            </a:r>
+            <a:r>
+              <a:rPr lang="en-US" sz="6000" b="1" dirty="0"/>
+              <a:t/>
             </a:r>
             <a:br>
               <a:rPr lang="en-US" sz="6000" b="1" dirty="0"/>

</xml_diff>